<commit_message>
Reset animation blend tree
- Deleting and adding resource data

- Upload Animator Blend Tree Tutorial
</commit_message>
<xml_diff>
--- a/Assets/Class/Animator/PPT Data/Animator Example.pptx
+++ b/Assets/Class/Animator/PPT Data/Animator Example.pptx
@@ -2,26 +2,26 @@
 <file path=ppt/presentation.xml><?xml version="1.0" encoding="utf-8"?>
 <p:presentation xmlns:a="http://schemas.openxmlformats.org/drawingml/2006/main" xmlns:r="http://schemas.openxmlformats.org/officeDocument/2006/relationships" xmlns:p="http://schemas.openxmlformats.org/presentationml/2006/main" xmlns:p14="http://schemas.microsoft.com/office/powerpoint/2010/main" saveSubsetFonts="1" firstSlideNum="0">
   <p:sldMasterIdLst>
-    <p:sldMasterId id="2147486276" r:id="rId12"/>
+    <p:sldMasterId id="2147486279" r:id="rId12"/>
   </p:sldMasterIdLst>
   <p:notesMasterIdLst>
     <p:notesMasterId r:id="rId14"/>
   </p:notesMasterIdLst>
   <p:sldIdLst>
     <p:sldId id="294" r:id="rId16"/>
-    <p:sldId id="295" r:id="rId17"/>
-    <p:sldId id="296" r:id="rId18"/>
-    <p:sldId id="316" r:id="rId19"/>
-    <p:sldId id="291" r:id="rId21"/>
-    <p:sldId id="297" r:id="rId23"/>
-    <p:sldId id="298" r:id="rId25"/>
-    <p:sldId id="300" r:id="rId27"/>
-    <p:sldId id="301" r:id="rId29"/>
-    <p:sldId id="302" r:id="rId31"/>
-    <p:sldId id="292" r:id="rId33"/>
-    <p:sldId id="303" r:id="rId35"/>
-    <p:sldId id="304" r:id="rId37"/>
-    <p:sldId id="317" r:id="rId39"/>
+    <p:sldId id="295" r:id="rId18"/>
+    <p:sldId id="296" r:id="rId20"/>
+    <p:sldId id="316" r:id="rId22"/>
+    <p:sldId id="291" r:id="rId24"/>
+    <p:sldId id="297" r:id="rId26"/>
+    <p:sldId id="298" r:id="rId27"/>
+    <p:sldId id="300" r:id="rId29"/>
+    <p:sldId id="301" r:id="rId31"/>
+    <p:sldId id="302" r:id="rId33"/>
+    <p:sldId id="292" r:id="rId35"/>
+    <p:sldId id="303" r:id="rId37"/>
+    <p:sldId id="304" r:id="rId39"/>
+    <p:sldId id="317" r:id="rId41"/>
   </p:sldIdLst>
   <p:sldSz cx="12192000" cy="6858000"/>
   <p:notesSz cx="6858000" cy="9144000"/>
@@ -11521,7 +11521,7 @@
       </p:sp>
       <p:pic>
         <p:nvPicPr>
-          <p:cNvPr id="1182" name="그림 13" descr="C:/Users/Admin1/AppData/Roaming/PolarisOffice/ETemp/7956_23580608/fImage58462206500.png"/>
+          <p:cNvPr id="1182" name="그림 13"/>
           <p:cNvPicPr>
             <a:picLocks noChangeAspect="1"/>
           </p:cNvPicPr>
@@ -11550,38 +11550,35 @@
           </a:solidFill>
         </p:spPr>
       </p:pic>
-      <p:cxnSp>
-        <p:nvCxnSpPr>
-          <p:cNvPr id="1179" name="도형 9"/>
-          <p:cNvCxnSpPr/>
+      <p:pic>
+        <p:nvPicPr>
+          <p:cNvPr id="1183" name="그림 1" descr="C:/Users/Admin1/AppData/Roaming/PolarisOffice/ETemp/10004_18209680/fImage22421734441.png"/>
+          <p:cNvPicPr>
+            <a:picLocks noChangeAspect="1"/>
+          </p:cNvPicPr>
           <p:nvPr/>
-        </p:nvCxnSpPr>
-        <p:spPr>
-          <a:xfrm rot="0" flipH="1">
-            <a:off x="7955915" y="2310130"/>
-            <a:ext cx="351155" cy="1905"/>
-          </a:xfrm>
-          <a:prstGeom prst="straightConnector1"/>
-          <a:ln w="6350" cap="flat" cmpd="sng">
-            <a:prstDash/>
-            <a:tailEnd type="triangle" w="med" len="med"/>
-          </a:ln>
-        </p:spPr>
-        <p:style>
-          <a:lnRef idx="1">
-            <a:schemeClr val="accent1"/>
-          </a:lnRef>
-          <a:fillRef idx="0">
-            <a:schemeClr val="accent1"/>
-          </a:fillRef>
-          <a:effectRef idx="0">
-            <a:schemeClr val="accent1"/>
-          </a:effectRef>
-          <a:fontRef idx="minor">
-            <a:schemeClr val="tx1"/>
-          </a:fontRef>
-        </p:style>
-      </p:cxnSp>
+        </p:nvPicPr>
+        <p:blipFill rotWithShape="1">
+          <a:blip r:embed="rId9" cstate="hqprint">
+            <a:extLst>
+              <a:ext uri="{28A0092B-C50C-407E-A947-70E740481C1C}">
+                <a14:useLocalDpi xmlns:a14="http://schemas.microsoft.com/office/drawing/2010/main"/>
+              </a:ext>
+            </a:extLst>
+          </a:blip>
+          <a:stretch>
+            <a:fillRect/>
+          </a:stretch>
+        </p:blipFill>
+        <p:spPr>
+          <a:xfrm rot="10800000">
+            <a:off x="7781290" y="1745615"/>
+            <a:ext cx="623570" cy="349885"/>
+          </a:xfrm>
+          <a:prstGeom prst="rect"/>
+          <a:noFill/>
+        </p:spPr>
+      </p:pic>
     </p:spTree>
   </p:cSld>
   <p:clrMapOvr>
@@ -12229,7 +12226,7 @@
       </p:pic>
       <p:pic>
         <p:nvPicPr>
-          <p:cNvPr id="1167" name="그림 109"/>
+          <p:cNvPr id="1167" name="그림 109" descr="C:/Users/Admin1/AppData/Roaming/PolarisOffice/ETemp/14072_9154248/fImage115223474827.png"/>
           <p:cNvPicPr>
             <a:picLocks noChangeAspect="1"/>
           </p:cNvPicPr>
@@ -12250,7 +12247,7 @@
         <p:spPr>
           <a:xfrm rot="0">
             <a:off x="6806565" y="1465580"/>
-            <a:ext cx="831850" cy="908050"/>
+            <a:ext cx="832485" cy="908685"/>
           </a:xfrm>
           <a:prstGeom prst="roundRect"/>
           <a:solidFill>
@@ -12269,7 +12266,7 @@
         <p:spPr>
           <a:xfrm rot="0">
             <a:off x="6797675" y="2490470"/>
-            <a:ext cx="4192270" cy="678180"/>
+            <a:ext cx="4192905" cy="678815"/>
           </a:xfrm>
           <a:prstGeom prst="rect"/>
           <a:noFill/>
@@ -12314,17 +12311,17 @@
       </p:sp>
       <p:pic>
         <p:nvPicPr>
-          <p:cNvPr id="1174" name="그림 18"/>
+          <p:cNvPr id="1174" name="그림 18" descr="C:/Users/Admin1/AppData/Roaming/PolarisOffice/ETemp/14072_9154248/fImage61383636334.png"/>
           <p:cNvPicPr>
             <a:picLocks noChangeAspect="1"/>
           </p:cNvPicPr>
           <p:nvPr/>
         </p:nvPicPr>
         <p:blipFill rotWithShape="1">
-          <a:blip r:embed="rId7" cstate="print">
+          <a:blip r:embed="rId7" cstate="hqprint">
             <a:extLst>
               <a:ext uri="{28A0092B-C50C-407E-A947-70E740481C1C}">
-                <a14:useLocalDpi xmlns:a14="http://schemas.microsoft.com/office/drawing/2010/main" val="0"/>
+                <a14:useLocalDpi xmlns:a14="http://schemas.microsoft.com/office/drawing/2010/main"/>
               </a:ext>
             </a:extLst>
           </a:blip>
@@ -12335,7 +12332,7 @@
         <p:spPr>
           <a:xfrm rot="0">
             <a:off x="7879715" y="1461135"/>
-            <a:ext cx="3118485" cy="903605"/>
+            <a:ext cx="3119120" cy="904240"/>
           </a:xfrm>
           <a:prstGeom prst="roundRect"/>
           <a:solidFill>
@@ -12374,7 +12371,7 @@
       </p:pic>
       <p:pic>
         <p:nvPicPr>
-          <p:cNvPr id="1176" name="그림 23"/>
+          <p:cNvPr id="1176" name="그림 23" descr="C:/Users/Admin1/AppData/Roaming/PolarisOffice/ETemp/14072_9154248/fImage10263376153.png"/>
           <p:cNvPicPr>
             <a:picLocks noChangeAspect="1"/>
           </p:cNvPicPr>
@@ -12395,7 +12392,7 @@
         <p:spPr>
           <a:xfrm rot="0">
             <a:off x="6805295" y="3306445"/>
-            <a:ext cx="4193540" cy="2105660"/>
+            <a:ext cx="4194175" cy="2106295"/>
           </a:xfrm>
           <a:prstGeom prst="roundRect"/>
           <a:solidFill>

</xml_diff>

<commit_message>
Added animation layer tutorial
- Add and set up an animation
  model

- Add and delete resource data
</commit_message>
<xml_diff>
--- a/Assets/Class/Animator/PPT Data/Animator Example.pptx
+++ b/Assets/Class/Animator/PPT Data/Animator Example.pptx
@@ -2,18 +2,18 @@
 <file path=ppt/presentation.xml><?xml version="1.0" encoding="utf-8"?>
 <p:presentation xmlns:a="http://schemas.openxmlformats.org/drawingml/2006/main" xmlns:r="http://schemas.openxmlformats.org/officeDocument/2006/relationships" xmlns:p="http://schemas.openxmlformats.org/presentationml/2006/main" xmlns:p14="http://schemas.microsoft.com/office/powerpoint/2010/main" saveSubsetFonts="1" firstSlideNum="0">
   <p:sldMasterIdLst>
-    <p:sldMasterId id="2147486279" r:id="rId12"/>
+    <p:sldMasterId id="2147486281" r:id="rId12"/>
   </p:sldMasterIdLst>
   <p:notesMasterIdLst>
     <p:notesMasterId r:id="rId14"/>
   </p:notesMasterIdLst>
   <p:sldIdLst>
     <p:sldId id="294" r:id="rId16"/>
-    <p:sldId id="295" r:id="rId18"/>
-    <p:sldId id="296" r:id="rId20"/>
-    <p:sldId id="316" r:id="rId22"/>
-    <p:sldId id="291" r:id="rId24"/>
-    <p:sldId id="297" r:id="rId26"/>
+    <p:sldId id="295" r:id="rId17"/>
+    <p:sldId id="296" r:id="rId19"/>
+    <p:sldId id="316" r:id="rId21"/>
+    <p:sldId id="291" r:id="rId23"/>
+    <p:sldId id="297" r:id="rId25"/>
     <p:sldId id="298" r:id="rId27"/>
     <p:sldId id="300" r:id="rId29"/>
     <p:sldId id="301" r:id="rId31"/>
@@ -7855,7 +7855,7 @@
       </p:sp>
       <p:pic>
         <p:nvPicPr>
-          <p:cNvPr id="1158" name="그림 3" descr="C:/Users/Admin1/AppData/Roaming/PolarisOffice/ETemp/9144_11002792/fImage40558127141.png"/>
+          <p:cNvPr id="1158" name="그림 3"/>
           <p:cNvPicPr>
             <a:picLocks noChangeAspect="1"/>
           </p:cNvPicPr>
@@ -7884,7 +7884,7 @@
       </p:pic>
       <p:pic>
         <p:nvPicPr>
-          <p:cNvPr id="1159" name="그림 4" descr="C:/Users/Admin1/AppData/Roaming/PolarisOffice/ETemp/9144_11002792/fImage211862728467.png"/>
+          <p:cNvPr id="1159" name="그림 4"/>
           <p:cNvPicPr>
             <a:picLocks noChangeAspect="1"/>
           </p:cNvPicPr>
@@ -7906,6 +7906,229 @@
           <a:xfrm rot="0">
             <a:off x="6816725" y="1359535"/>
             <a:ext cx="4259580" cy="4003040"/>
+          </a:xfrm>
+          <a:prstGeom prst="rect"/>
+          <a:noFill/>
+        </p:spPr>
+      </p:pic>
+      <p:sp>
+        <p:nvSpPr>
+          <p:cNvPr id="1160" name="텍스트 상자 1"/>
+          <p:cNvSpPr txBox="1">
+            <a:spLocks/>
+          </p:cNvSpPr>
+          <p:nvPr/>
+        </p:nvSpPr>
+        <p:spPr>
+          <a:xfrm rot="0">
+            <a:off x="4528820" y="379730"/>
+            <a:ext cx="3144520" cy="554990"/>
+          </a:xfrm>
+          <a:prstGeom prst="rect"/>
+          <a:noFill/>
+          <a:ln w="0">
+            <a:noFill/>
+            <a:prstDash/>
+          </a:ln>
+        </p:spPr>
+        <p:txBody>
+          <a:bodyPr wrap="square" lIns="89535" tIns="46355" rIns="89535" bIns="46355" numCol="1" vert="horz" anchor="t">
+            <a:spAutoFit/>
+          </a:bodyPr>
+          <a:lstStyle/>
+          <a:p>
+            <a:pPr marL="0" indent="0" algn="l" latinLnBrk="0">
+              <a:buFontTx/>
+              <a:buNone/>
+            </a:pPr>
+            <a:r>
+              <a:rPr lang="ko-KR" altLang="en-US" sz="3000" b="1">
+                <a:solidFill>
+                  <a:schemeClr val="tx1"/>
+                </a:solidFill>
+                <a:latin typeface="맑은 고딕" charset="0"/>
+                <a:ea typeface="맑은 고딕" charset="0"/>
+              </a:rPr>
+              <a:t>첫 번째 튜토리얼</a:t>
+            </a:r>
+            <a:endParaRPr lang="ko-KR" altLang="en-US" sz="3000" b="1">
+              <a:solidFill>
+                <a:schemeClr val="tx1"/>
+              </a:solidFill>
+              <a:latin typeface="맑은 고딕" charset="0"/>
+              <a:ea typeface="맑은 고딕" charset="0"/>
+            </a:endParaRPr>
+          </a:p>
+        </p:txBody>
+      </p:sp>
+      <p:sp>
+        <p:nvSpPr>
+          <p:cNvPr id="1161" name="텍스트 상자 2"/>
+          <p:cNvSpPr txBox="1">
+            <a:spLocks/>
+          </p:cNvSpPr>
+          <p:nvPr/>
+        </p:nvSpPr>
+        <p:spPr>
+          <a:xfrm rot="0">
+            <a:off x="1263650" y="5208905"/>
+            <a:ext cx="4142740" cy="955040"/>
+          </a:xfrm>
+          <a:prstGeom prst="rect"/>
+          <a:noFill/>
+          <a:ln w="0">
+            <a:noFill/>
+            <a:prstDash/>
+          </a:ln>
+        </p:spPr>
+        <p:txBody>
+          <a:bodyPr wrap="square" lIns="89535" tIns="46355" rIns="89535" bIns="46355" numCol="1" vert="horz" anchor="t">
+            <a:spAutoFit/>
+          </a:bodyPr>
+          <a:lstStyle/>
+          <a:p>
+            <a:pPr marL="0" indent="0" algn="l" latinLnBrk="0" hangingPunct="1">
+              <a:buFontTx/>
+              <a:buNone/>
+            </a:pPr>
+            <a:r>
+              <a:rPr lang="ko-KR" sz="2000" b="1">
+                <a:solidFill>
+                  <a:srgbClr val="0611F2"/>
+                </a:solidFill>
+                <a:latin typeface="맑은 고딕" charset="0"/>
+                <a:ea typeface="맑은 고딕" charset="0"/>
+              </a:rPr>
+              <a:t>1.</a:t>
+            </a:r>
+            <a:r>
+              <a:rPr lang="ko-KR" sz="2000">
+                <a:latin typeface="맑은 고딕" charset="0"/>
+                <a:ea typeface="맑은 고딕" charset="0"/>
+              </a:rPr>
+              <a:t> 첫 번째로 Google에 </a:t>
+            </a:r>
+            <a:r>
+              <a:rPr lang="ko-KR" sz="1800">
+                <a:latin typeface="맑은 고딕" charset="0"/>
+                <a:ea typeface="맑은 고딕" charset="0"/>
+              </a:rPr>
+              <a:t>mixamo라고 검색한 다음 사이트에 접속하여 Sign Up for Free를 선택합니다.</a:t>
+            </a:r>
+            <a:endParaRPr lang="ko-KR" altLang="en-US" sz="1800">
+              <a:latin typeface="맑은 고딕" charset="0"/>
+              <a:ea typeface="맑은 고딕" charset="0"/>
+            </a:endParaRPr>
+          </a:p>
+        </p:txBody>
+      </p:sp>
+      <p:sp>
+        <p:nvSpPr>
+          <p:cNvPr id="1162" name="텍스트 상자 3"/>
+          <p:cNvSpPr txBox="1">
+            <a:spLocks/>
+          </p:cNvSpPr>
+          <p:nvPr/>
+        </p:nvSpPr>
+        <p:spPr>
+          <a:xfrm rot="0">
+            <a:off x="6825615" y="5482590"/>
+            <a:ext cx="4259580" cy="680085"/>
+          </a:xfrm>
+          <a:prstGeom prst="rect"/>
+          <a:noFill/>
+          <a:ln w="0">
+            <a:noFill/>
+            <a:prstDash/>
+          </a:ln>
+        </p:spPr>
+        <p:txBody>
+          <a:bodyPr wrap="square" lIns="89535" tIns="46355" rIns="89535" bIns="46355" numCol="1" vert="horz" anchor="t">
+            <a:spAutoFit/>
+          </a:bodyPr>
+          <a:lstStyle/>
+          <a:p>
+            <a:pPr marL="0" indent="0" algn="l" latinLnBrk="0" hangingPunct="1">
+              <a:buFontTx/>
+              <a:buNone/>
+            </a:pPr>
+            <a:r>
+              <a:rPr lang="ko-KR" sz="2000" b="1">
+                <a:solidFill>
+                  <a:srgbClr val="0611F2"/>
+                </a:solidFill>
+                <a:latin typeface="맑은 고딕" charset="0"/>
+                <a:ea typeface="맑은 고딕" charset="0"/>
+              </a:rPr>
+              <a:t>2. </a:t>
+            </a:r>
+            <a:r>
+              <a:rPr lang="ko-KR" sz="1800">
+                <a:latin typeface="맑은 고딕" charset="0"/>
+                <a:ea typeface="맑은 고딕" charset="0"/>
+              </a:rPr>
+              <a:t>그리고 Google 계정으로 로그인을 시도합니다.</a:t>
+            </a:r>
+            <a:endParaRPr lang="ko-KR" altLang="en-US" sz="1800">
+              <a:latin typeface="맑은 고딕" charset="0"/>
+              <a:ea typeface="맑은 고딕" charset="0"/>
+            </a:endParaRPr>
+          </a:p>
+        </p:txBody>
+      </p:sp>
+      <p:pic>
+        <p:nvPicPr>
+          <p:cNvPr id="1163" name="그림 4" descr="C:/Users/Admin1/AppData/Roaming/PolarisOffice/ETemp/14200_8900632/fImage40558127141.png"/>
+          <p:cNvPicPr>
+            <a:picLocks noChangeAspect="1"/>
+          </p:cNvPicPr>
+          <p:nvPr/>
+        </p:nvPicPr>
+        <p:blipFill rotWithShape="1">
+          <a:blip r:embed="rId2" cstate="hqprint">
+            <a:extLst>
+              <a:ext uri="{28A0092B-C50C-407E-A947-70E740481C1C}">
+                <a14:useLocalDpi xmlns:a14="http://schemas.microsoft.com/office/drawing/2010/main"/>
+              </a:ext>
+            </a:extLst>
+          </a:blip>
+          <a:stretch>
+            <a:fillRect/>
+          </a:stretch>
+        </p:blipFill>
+        <p:spPr>
+          <a:xfrm rot="0">
+            <a:off x="1267460" y="1371600"/>
+            <a:ext cx="4138295" cy="3709670"/>
+          </a:xfrm>
+          <a:prstGeom prst="rect"/>
+          <a:noFill/>
+        </p:spPr>
+      </p:pic>
+      <p:pic>
+        <p:nvPicPr>
+          <p:cNvPr id="1164" name="그림 5" descr="C:/Users/Admin1/AppData/Roaming/PolarisOffice/ETemp/14200_8900632/fImage211862728467.png"/>
+          <p:cNvPicPr>
+            <a:picLocks noChangeAspect="1"/>
+          </p:cNvPicPr>
+          <p:nvPr/>
+        </p:nvPicPr>
+        <p:blipFill rotWithShape="1">
+          <a:blip r:embed="rId3" cstate="hqprint">
+            <a:extLst>
+              <a:ext uri="{28A0092B-C50C-407E-A947-70E740481C1C}">
+                <a14:useLocalDpi xmlns:a14="http://schemas.microsoft.com/office/drawing/2010/main"/>
+              </a:ext>
+            </a:extLst>
+          </a:blip>
+          <a:stretch>
+            <a:fillRect/>
+          </a:stretch>
+        </p:blipFill>
+        <p:spPr>
+          <a:xfrm rot="0">
+            <a:off x="6816725" y="1359535"/>
+            <a:ext cx="4260215" cy="4003675"/>
           </a:xfrm>
           <a:prstGeom prst="rect"/>
           <a:noFill/>

</xml_diff>

<commit_message>
Photon Server PPT Data Update
- Add resource data
</commit_message>
<xml_diff>
--- a/Assets/Class/Animator/PPT Data/Animator Example.pptx
+++ b/Assets/Class/Animator/PPT Data/Animator Example.pptx
@@ -2,26 +2,26 @@
 <file path=ppt/presentation.xml><?xml version="1.0" encoding="utf-8"?>
 <p:presentation xmlns:a="http://schemas.openxmlformats.org/drawingml/2006/main" xmlns:r="http://schemas.openxmlformats.org/officeDocument/2006/relationships" xmlns:p="http://schemas.openxmlformats.org/presentationml/2006/main" xmlns:p14="http://schemas.microsoft.com/office/powerpoint/2010/main" saveSubsetFonts="1" firstSlideNum="0">
   <p:sldMasterIdLst>
-    <p:sldMasterId id="2147486293" r:id="rId12"/>
+    <p:sldMasterId id="2147486295" r:id="rId12"/>
   </p:sldMasterIdLst>
   <p:notesMasterIdLst>
     <p:notesMasterId r:id="rId14"/>
   </p:notesMasterIdLst>
   <p:sldIdLst>
     <p:sldId id="294" r:id="rId16"/>
-    <p:sldId id="295" r:id="rId18"/>
-    <p:sldId id="296" r:id="rId20"/>
+    <p:sldId id="295" r:id="rId17"/>
+    <p:sldId id="296" r:id="rId19"/>
     <p:sldId id="316" r:id="rId21"/>
     <p:sldId id="291" r:id="rId23"/>
-    <p:sldId id="297" r:id="rId24"/>
-    <p:sldId id="298" r:id="rId25"/>
-    <p:sldId id="300" r:id="rId26"/>
-    <p:sldId id="301" r:id="rId27"/>
-    <p:sldId id="302" r:id="rId28"/>
-    <p:sldId id="292" r:id="rId29"/>
-    <p:sldId id="303" r:id="rId30"/>
-    <p:sldId id="304" r:id="rId31"/>
-    <p:sldId id="317" r:id="rId32"/>
+    <p:sldId id="297" r:id="rId25"/>
+    <p:sldId id="298" r:id="rId27"/>
+    <p:sldId id="300" r:id="rId29"/>
+    <p:sldId id="301" r:id="rId31"/>
+    <p:sldId id="302" r:id="rId33"/>
+    <p:sldId id="292" r:id="rId35"/>
+    <p:sldId id="303" r:id="rId37"/>
+    <p:sldId id="304" r:id="rId39"/>
+    <p:sldId id="317" r:id="rId41"/>
   </p:sldIdLst>
   <p:sldSz cx="12192000" cy="6858000"/>
   <p:notesSz cx="6858000" cy="9144000"/>
@@ -7853,64 +7853,6 @@
           </a:p>
         </p:txBody>
       </p:sp>
-      <p:pic>
-        <p:nvPicPr>
-          <p:cNvPr id="1158" name="그림 3"/>
-          <p:cNvPicPr>
-            <a:picLocks noChangeAspect="1"/>
-          </p:cNvPicPr>
-          <p:nvPr/>
-        </p:nvPicPr>
-        <p:blipFill rotWithShape="1">
-          <a:blip r:embed="rId2" cstate="hqprint">
-            <a:extLst>
-              <a:ext uri="{28A0092B-C50C-407E-A947-70E740481C1C}">
-                <a14:useLocalDpi xmlns:a14="http://schemas.microsoft.com/office/drawing/2010/main"/>
-              </a:ext>
-            </a:extLst>
-          </a:blip>
-          <a:stretch>
-            <a:fillRect/>
-          </a:stretch>
-        </p:blipFill>
-        <p:spPr>
-          <a:xfrm rot="0">
-            <a:off x="1267460" y="1371600"/>
-            <a:ext cx="4137660" cy="3709035"/>
-          </a:xfrm>
-          <a:prstGeom prst="rect"/>
-          <a:noFill/>
-        </p:spPr>
-      </p:pic>
-      <p:pic>
-        <p:nvPicPr>
-          <p:cNvPr id="1159" name="그림 4"/>
-          <p:cNvPicPr>
-            <a:picLocks noChangeAspect="1"/>
-          </p:cNvPicPr>
-          <p:nvPr/>
-        </p:nvPicPr>
-        <p:blipFill rotWithShape="1">
-          <a:blip r:embed="rId3" cstate="hqprint">
-            <a:extLst>
-              <a:ext uri="{28A0092B-C50C-407E-A947-70E740481C1C}">
-                <a14:useLocalDpi xmlns:a14="http://schemas.microsoft.com/office/drawing/2010/main"/>
-              </a:ext>
-            </a:extLst>
-          </a:blip>
-          <a:stretch>
-            <a:fillRect/>
-          </a:stretch>
-        </p:blipFill>
-        <p:spPr>
-          <a:xfrm rot="0">
-            <a:off x="6816725" y="1359535"/>
-            <a:ext cx="4259580" cy="4003040"/>
-          </a:xfrm>
-          <a:prstGeom prst="rect"/>
-          <a:noFill/>
-        </p:spPr>
-      </p:pic>
       <p:sp>
         <p:nvSpPr>
           <p:cNvPr id="1160" name="텍스트 상자 1"/>
@@ -7961,179 +7903,6 @@
           </a:p>
         </p:txBody>
       </p:sp>
-      <p:sp>
-        <p:nvSpPr>
-          <p:cNvPr id="1161" name="텍스트 상자 2"/>
-          <p:cNvSpPr txBox="1">
-            <a:spLocks/>
-          </p:cNvSpPr>
-          <p:nvPr/>
-        </p:nvSpPr>
-        <p:spPr>
-          <a:xfrm rot="0">
-            <a:off x="1263650" y="5208905"/>
-            <a:ext cx="4142740" cy="955040"/>
-          </a:xfrm>
-          <a:prstGeom prst="rect"/>
-          <a:noFill/>
-          <a:ln w="0">
-            <a:noFill/>
-            <a:prstDash/>
-          </a:ln>
-        </p:spPr>
-        <p:txBody>
-          <a:bodyPr wrap="square" lIns="89535" tIns="46355" rIns="89535" bIns="46355" numCol="1" vert="horz" anchor="t">
-            <a:spAutoFit/>
-          </a:bodyPr>
-          <a:lstStyle/>
-          <a:p>
-            <a:pPr marL="0" indent="0" algn="l" latinLnBrk="0" hangingPunct="1">
-              <a:buFontTx/>
-              <a:buNone/>
-            </a:pPr>
-            <a:r>
-              <a:rPr lang="ko-KR" sz="2000" b="1">
-                <a:solidFill>
-                  <a:srgbClr val="0611F2"/>
-                </a:solidFill>
-                <a:latin typeface="맑은 고딕" charset="0"/>
-                <a:ea typeface="맑은 고딕" charset="0"/>
-              </a:rPr>
-              <a:t>1.</a:t>
-            </a:r>
-            <a:r>
-              <a:rPr lang="ko-KR" sz="2000">
-                <a:latin typeface="맑은 고딕" charset="0"/>
-                <a:ea typeface="맑은 고딕" charset="0"/>
-              </a:rPr>
-              <a:t> 첫 번째로 Google에 </a:t>
-            </a:r>
-            <a:r>
-              <a:rPr lang="ko-KR" sz="1800">
-                <a:latin typeface="맑은 고딕" charset="0"/>
-                <a:ea typeface="맑은 고딕" charset="0"/>
-              </a:rPr>
-              <a:t>mixamo라고 검색한 다음 사이트에 접속하여 Sign Up for Free를 선택합니다.</a:t>
-            </a:r>
-            <a:endParaRPr lang="ko-KR" altLang="en-US" sz="1800">
-              <a:latin typeface="맑은 고딕" charset="0"/>
-              <a:ea typeface="맑은 고딕" charset="0"/>
-            </a:endParaRPr>
-          </a:p>
-        </p:txBody>
-      </p:sp>
-      <p:sp>
-        <p:nvSpPr>
-          <p:cNvPr id="1162" name="텍스트 상자 3"/>
-          <p:cNvSpPr txBox="1">
-            <a:spLocks/>
-          </p:cNvSpPr>
-          <p:nvPr/>
-        </p:nvSpPr>
-        <p:spPr>
-          <a:xfrm rot="0">
-            <a:off x="6825615" y="5482590"/>
-            <a:ext cx="4259580" cy="680085"/>
-          </a:xfrm>
-          <a:prstGeom prst="rect"/>
-          <a:noFill/>
-          <a:ln w="0">
-            <a:noFill/>
-            <a:prstDash/>
-          </a:ln>
-        </p:spPr>
-        <p:txBody>
-          <a:bodyPr wrap="square" lIns="89535" tIns="46355" rIns="89535" bIns="46355" numCol="1" vert="horz" anchor="t">
-            <a:spAutoFit/>
-          </a:bodyPr>
-          <a:lstStyle/>
-          <a:p>
-            <a:pPr marL="0" indent="0" algn="l" latinLnBrk="0" hangingPunct="1">
-              <a:buFontTx/>
-              <a:buNone/>
-            </a:pPr>
-            <a:r>
-              <a:rPr lang="ko-KR" sz="2000" b="1">
-                <a:solidFill>
-                  <a:srgbClr val="0611F2"/>
-                </a:solidFill>
-                <a:latin typeface="맑은 고딕" charset="0"/>
-                <a:ea typeface="맑은 고딕" charset="0"/>
-              </a:rPr>
-              <a:t>2. </a:t>
-            </a:r>
-            <a:r>
-              <a:rPr lang="ko-KR" sz="1800">
-                <a:latin typeface="맑은 고딕" charset="0"/>
-                <a:ea typeface="맑은 고딕" charset="0"/>
-              </a:rPr>
-              <a:t>그리고 Google 계정으로 로그인을 시도합니다.</a:t>
-            </a:r>
-            <a:endParaRPr lang="ko-KR" altLang="en-US" sz="1800">
-              <a:latin typeface="맑은 고딕" charset="0"/>
-              <a:ea typeface="맑은 고딕" charset="0"/>
-            </a:endParaRPr>
-          </a:p>
-        </p:txBody>
-      </p:sp>
-      <p:pic>
-        <p:nvPicPr>
-          <p:cNvPr id="1163" name="그림 4" descr="C:/Users/Admin1/AppData/Roaming/PolarisOffice/ETemp/14200_8900632/fImage40558127141.png"/>
-          <p:cNvPicPr>
-            <a:picLocks noChangeAspect="1"/>
-          </p:cNvPicPr>
-          <p:nvPr/>
-        </p:nvPicPr>
-        <p:blipFill rotWithShape="1">
-          <a:blip r:embed="rId2" cstate="hqprint">
-            <a:extLst>
-              <a:ext uri="{28A0092B-C50C-407E-A947-70E740481C1C}">
-                <a14:useLocalDpi xmlns:a14="http://schemas.microsoft.com/office/drawing/2010/main"/>
-              </a:ext>
-            </a:extLst>
-          </a:blip>
-          <a:stretch>
-            <a:fillRect/>
-          </a:stretch>
-        </p:blipFill>
-        <p:spPr>
-          <a:xfrm rot="0">
-            <a:off x="1267460" y="1371600"/>
-            <a:ext cx="4138295" cy="3709670"/>
-          </a:xfrm>
-          <a:prstGeom prst="rect"/>
-          <a:noFill/>
-        </p:spPr>
-      </p:pic>
-      <p:pic>
-        <p:nvPicPr>
-          <p:cNvPr id="1164" name="그림 5" descr="C:/Users/Admin1/AppData/Roaming/PolarisOffice/ETemp/14200_8900632/fImage211862728467.png"/>
-          <p:cNvPicPr>
-            <a:picLocks noChangeAspect="1"/>
-          </p:cNvPicPr>
-          <p:nvPr/>
-        </p:nvPicPr>
-        <p:blipFill rotWithShape="1">
-          <a:blip r:embed="rId3" cstate="hqprint">
-            <a:extLst>
-              <a:ext uri="{28A0092B-C50C-407E-A947-70E740481C1C}">
-                <a14:useLocalDpi xmlns:a14="http://schemas.microsoft.com/office/drawing/2010/main"/>
-              </a:ext>
-            </a:extLst>
-          </a:blip>
-          <a:stretch>
-            <a:fillRect/>
-          </a:stretch>
-        </p:blipFill>
-        <p:spPr>
-          <a:xfrm rot="0">
-            <a:off x="6816725" y="1359535"/>
-            <a:ext cx="4260215" cy="4003675"/>
-          </a:xfrm>
-          <a:prstGeom prst="rect"/>
-          <a:noFill/>
-        </p:spPr>
-      </p:pic>
     </p:spTree>
   </p:cSld>
   <p:clrMapOvr>

</xml_diff>